<commit_message>
feat: Update PowerPoint template and enhance layout generation
- Replace default_template.pptx with an updated version
- Remove obsolete default_template.pptx.pptx file
- Enhance generate_layout.py to display available slide layouts and improve slide creation with existing placeholders
- Update placeholder_functions.py to include RGBColor for better color handling

This update improves the PowerPoint generation process by utilizing existing layouts and enhancing the overall template structure.
</commit_message>
<xml_diff>
--- a/examples/template/default_template.pptx
+++ b/examples/template/default_template.pptx
@@ -7,6 +7,10 @@
   <p:sldIdLst>
     <p:sldId id="256" r:id="rId2"/>
     <p:sldId id="257" r:id="rId7"/>
+    <p:sldId id="258" r:id="rId8"/>
+    <p:sldId id="259" r:id="rId9"/>
+    <p:sldId id="260" r:id="rId10"/>
+    <p:sldId id="261" r:id="rId11"/>
   </p:sldIdLst>
   <p:sldSz cx="9144000" cy="6858000" type="screen4x3"/>
   <p:notesSz cx="6858000" cy="9144000"/>
@@ -124,6 +128,238 @@
 </p:presentation>
 </file>
 
+<file path=ppt/charts/chart1.xml><?xml version="1.0" encoding="utf-8"?>
+<c:chartSpace xmlns:c="http://schemas.openxmlformats.org/drawingml/2006/chart" xmlns:a="http://schemas.openxmlformats.org/drawingml/2006/main" xmlns:r="http://schemas.openxmlformats.org/officeDocument/2006/relationships">
+  <c:date1904 val="0"/>
+  <c:chart>
+    <c:autoTitleDeleted val="0"/>
+    <c:plotArea>
+      <c:barChart>
+        <c:barDir val="col"/>
+        <c:grouping val="clustered"/>
+        <c:ser>
+          <c:idx val="0"/>
+          <c:order val="0"/>
+          <c:tx>
+            <c:strRef>
+              <c:f>Sheet1!$B$1</c:f>
+              <c:strCache>
+                <c:ptCount val="1"/>
+                <c:pt idx="0">
+                  <c:v>Series 1</c:v>
+                </c:pt>
+              </c:strCache>
+            </c:strRef>
+          </c:tx>
+          <c:cat>
+            <c:strRef>
+              <c:f>Sheet1!$A$2:$A$5</c:f>
+              <c:strCache>
+                <c:ptCount val="4"/>
+                <c:pt idx="0">
+                  <c:v>Q1</c:v>
+                </c:pt>
+                <c:pt idx="1">
+                  <c:v>Q2</c:v>
+                </c:pt>
+                <c:pt idx="2">
+                  <c:v>Q3</c:v>
+                </c:pt>
+                <c:pt idx="3">
+                  <c:v>Q4</c:v>
+                </c:pt>
+              </c:strCache>
+            </c:strRef>
+          </c:cat>
+          <c:val>
+            <c:numRef>
+              <c:f>Sheet1!$B$2:$B$5</c:f>
+              <c:numCache>
+                <c:formatCode>General</c:formatCode>
+                <c:ptCount val="4"/>
+                <c:pt idx="0">
+                  <c:v>20</c:v>
+                </c:pt>
+                <c:pt idx="1">
+                  <c:v>30</c:v>
+                </c:pt>
+                <c:pt idx="2">
+                  <c:v>25</c:v>
+                </c:pt>
+                <c:pt idx="3">
+                  <c:v>35</c:v>
+                </c:pt>
+              </c:numCache>
+            </c:numRef>
+          </c:val>
+        </c:ser>
+        <c:axId val="-2068027336"/>
+        <c:axId val="-2113994440"/>
+      </c:barChart>
+      <c:catAx>
+        <c:axId val="-2068027336"/>
+        <c:scaling>
+          <c:orientation val="minMax"/>
+        </c:scaling>
+        <c:delete val="0"/>
+        <c:axPos val="b"/>
+        <c:majorTickMark val="out"/>
+        <c:minorTickMark val="none"/>
+        <c:tickLblPos val="nextTo"/>
+        <c:crossAx val="-2113994440"/>
+        <c:crosses val="autoZero"/>
+        <c:auto val="1"/>
+        <c:lblAlgn val="ctr"/>
+        <c:lblOffset val="100"/>
+        <c:noMultiLvlLbl val="0"/>
+      </c:catAx>
+      <c:valAx>
+        <c:axId val="-2113994440"/>
+        <c:scaling/>
+        <c:delete val="0"/>
+        <c:axPos val="l"/>
+        <c:majorGridlines/>
+        <c:majorTickMark val="out"/>
+        <c:minorTickMark val="none"/>
+        <c:tickLblPos val="nextTo"/>
+        <c:crossAx val="-2068027336"/>
+        <c:crosses val="autoZero"/>
+      </c:valAx>
+    </c:plotArea>
+    <c:dispBlanksAs val="gap"/>
+  </c:chart>
+  <c:txPr>
+    <a:bodyPr/>
+    <a:lstStyle/>
+    <a:p>
+      <a:pPr>
+        <a:defRPr sz="1800"/>
+      </a:pPr>
+      <a:endParaRPr lang="en-US"/>
+    </a:p>
+  </c:txPr>
+  <c:externalData r:id="rId1">
+    <c:autoUpdate val="0"/>
+  </c:externalData>
+</c:chartSpace>
+</file>
+
+<file path=ppt/charts/chart2.xml><?xml version="1.0" encoding="utf-8"?>
+<c:chartSpace xmlns:c="http://schemas.openxmlformats.org/drawingml/2006/chart" xmlns:a="http://schemas.openxmlformats.org/drawingml/2006/main" xmlns:r="http://schemas.openxmlformats.org/officeDocument/2006/relationships">
+  <c:date1904 val="0"/>
+  <c:chart>
+    <c:autoTitleDeleted val="0"/>
+    <c:plotArea>
+      <c:barChart>
+        <c:barDir val="col"/>
+        <c:grouping val="clustered"/>
+        <c:ser>
+          <c:idx val="0"/>
+          <c:order val="0"/>
+          <c:tx>
+            <c:strRef>
+              <c:f>Sheet1!$B$1</c:f>
+              <c:strCache>
+                <c:ptCount val="1"/>
+                <c:pt idx="0">
+                  <c:v>Series 1</c:v>
+                </c:pt>
+              </c:strCache>
+            </c:strRef>
+          </c:tx>
+          <c:cat>
+            <c:strRef>
+              <c:f>Sheet1!$A$2:$A$5</c:f>
+              <c:strCache>
+                <c:ptCount val="4"/>
+                <c:pt idx="0">
+                  <c:v>Q1</c:v>
+                </c:pt>
+                <c:pt idx="1">
+                  <c:v>Q2</c:v>
+                </c:pt>
+                <c:pt idx="2">
+                  <c:v>Q3</c:v>
+                </c:pt>
+                <c:pt idx="3">
+                  <c:v>Q4</c:v>
+                </c:pt>
+              </c:strCache>
+            </c:strRef>
+          </c:cat>
+          <c:val>
+            <c:numRef>
+              <c:f>Sheet1!$B$2:$B$5</c:f>
+              <c:numCache>
+                <c:formatCode>General</c:formatCode>
+                <c:ptCount val="4"/>
+                <c:pt idx="0">
+                  <c:v>20</c:v>
+                </c:pt>
+                <c:pt idx="1">
+                  <c:v>30</c:v>
+                </c:pt>
+                <c:pt idx="2">
+                  <c:v>25</c:v>
+                </c:pt>
+                <c:pt idx="3">
+                  <c:v>35</c:v>
+                </c:pt>
+              </c:numCache>
+            </c:numRef>
+          </c:val>
+        </c:ser>
+        <c:axId val="-2068027336"/>
+        <c:axId val="-2113994440"/>
+      </c:barChart>
+      <c:catAx>
+        <c:axId val="-2068027336"/>
+        <c:scaling>
+          <c:orientation val="minMax"/>
+        </c:scaling>
+        <c:delete val="0"/>
+        <c:axPos val="b"/>
+        <c:majorTickMark val="out"/>
+        <c:minorTickMark val="none"/>
+        <c:tickLblPos val="nextTo"/>
+        <c:crossAx val="-2113994440"/>
+        <c:crosses val="autoZero"/>
+        <c:auto val="1"/>
+        <c:lblAlgn val="ctr"/>
+        <c:lblOffset val="100"/>
+        <c:noMultiLvlLbl val="0"/>
+      </c:catAx>
+      <c:valAx>
+        <c:axId val="-2113994440"/>
+        <c:scaling/>
+        <c:delete val="0"/>
+        <c:axPos val="l"/>
+        <c:majorGridlines/>
+        <c:majorTickMark val="out"/>
+        <c:minorTickMark val="none"/>
+        <c:tickLblPos val="nextTo"/>
+        <c:crossAx val="-2068027336"/>
+        <c:crosses val="autoZero"/>
+      </c:valAx>
+    </c:plotArea>
+    <c:dispBlanksAs val="gap"/>
+  </c:chart>
+  <c:txPr>
+    <a:bodyPr/>
+    <a:lstStyle/>
+    <a:p>
+      <a:pPr>
+        <a:defRPr sz="1800"/>
+      </a:pPr>
+      <a:endParaRPr lang="en-US"/>
+    </a:p>
+  </c:txPr>
+  <c:externalData r:id="rId1">
+    <c:autoUpdate val="0"/>
+  </c:externalData>
+</c:chartSpace>
+</file>
+
 <file path=ppt/slideLayouts/slideLayout1.xml><?xml version="1.0" encoding="utf-8"?>
 <p:sldLayout xmlns:a="http://schemas.openxmlformats.org/drawingml/2006/main" xmlns:r="http://schemas.openxmlformats.org/officeDocument/2006/relationships" xmlns:p="http://schemas.openxmlformats.org/presentationml/2006/main" preserve="1" userDrawn="1">
   <p:cSld name="Title Slide">
@@ -475,6 +711,943 @@
         <p:nvPr/>
       </p:nvGrpSpPr>
       <p:grpSpPr/>
+      <p:sp>
+        <p:nvSpPr>
+          <p:cNvPr id="2" name="TextBox 1"/>
+          <p:cNvSpPr txBox="1"/>
+          <p:nvPr/>
+        </p:nvSpPr>
+        <p:spPr>
+          <a:xfrm>
+            <a:off x="914400" y="457200"/>
+            <a:ext cx="7315200" cy="1371600"/>
+          </a:xfrm>
+          <a:prstGeom prst="rect">
+            <a:avLst/>
+          </a:prstGeom>
+          <a:noFill/>
+        </p:spPr>
+        <p:txBody>
+          <a:bodyPr wrap="none">
+            <a:spAutoFit/>
+          </a:bodyPr>
+          <a:lstStyle/>
+          <a:p>
+            <a:pPr algn="ctr">
+              <a:defRPr sz="4400" b="1"/>
+            </a:pPr>
+            <a:r>
+              <a:t>Title Text</a:t>
+            </a:r>
+          </a:p>
+        </p:txBody>
+      </p:sp>
+      <p:sp>
+        <p:nvSpPr>
+          <p:cNvPr id="3" name="TextBox 2"/>
+          <p:cNvSpPr txBox="1"/>
+          <p:nvPr/>
+        </p:nvSpPr>
+        <p:spPr>
+          <a:xfrm>
+            <a:off x="914400" y="1828800"/>
+            <a:ext cx="7315200" cy="3657600"/>
+          </a:xfrm>
+          <a:prstGeom prst="rect">
+            <a:avLst/>
+          </a:prstGeom>
+          <a:noFill/>
+        </p:spPr>
+        <p:txBody>
+          <a:bodyPr wrap="none">
+            <a:spAutoFit/>
+          </a:bodyPr>
+          <a:lstStyle/>
+          <a:p>
+            <a:pPr>
+              <a:defRPr sz="1800"/>
+            </a:pPr>
+            <a:r>
+              <a:t>Body content</a:t>
+            </a:r>
+          </a:p>
+          <a:p>
+            <a:r>
+              <a:t>• Bullet point 1</a:t>
+            </a:r>
+          </a:p>
+          <a:p>
+            <a:r>
+              <a:t>• Bullet point 2</a:t>
+            </a:r>
+          </a:p>
+        </p:txBody>
+      </p:sp>
+    </p:spTree>
+  </p:cSld>
+  <p:clrMapOvr>
+    <a:masterClrMapping/>
+  </p:clrMapOvr>
+</p:sld>
+</file>
+
+<file path=ppt/slides/slide3.xml><?xml version="1.0" encoding="utf-8"?>
+<p:sld xmlns:a="http://schemas.openxmlformats.org/drawingml/2006/main" xmlns:p="http://schemas.openxmlformats.org/presentationml/2006/main" xmlns:r="http://schemas.openxmlformats.org/officeDocument/2006/relationships">
+  <p:cSld>
+    <p:spTree>
+      <p:nvGrpSpPr>
+        <p:cNvPr id="1" name=""/>
+        <p:cNvGrpSpPr/>
+        <p:nvPr/>
+      </p:nvGrpSpPr>
+      <p:grpSpPr/>
+      <p:sp>
+        <p:nvSpPr>
+          <p:cNvPr id="2" name="TextBox 1"/>
+          <p:cNvSpPr txBox="1"/>
+          <p:nvPr/>
+        </p:nvSpPr>
+        <p:spPr>
+          <a:xfrm>
+            <a:off x="914400" y="457200"/>
+            <a:ext cx="7315200" cy="1371600"/>
+          </a:xfrm>
+          <a:prstGeom prst="rect">
+            <a:avLst/>
+          </a:prstGeom>
+          <a:noFill/>
+        </p:spPr>
+        <p:txBody>
+          <a:bodyPr wrap="none">
+            <a:spAutoFit/>
+          </a:bodyPr>
+          <a:lstStyle/>
+          <a:p>
+            <a:pPr algn="ctr">
+              <a:defRPr sz="4400" b="1"/>
+            </a:pPr>
+            <a:r>
+              <a:t>Title Text</a:t>
+            </a:r>
+          </a:p>
+        </p:txBody>
+      </p:sp>
+      <p:sp>
+        <p:nvSpPr>
+          <p:cNvPr id="3" name="TextBox 2"/>
+          <p:cNvSpPr txBox="1"/>
+          <p:nvPr/>
+        </p:nvSpPr>
+        <p:spPr>
+          <a:xfrm>
+            <a:off x="914400" y="1828800"/>
+            <a:ext cx="7315200" cy="3657600"/>
+          </a:xfrm>
+          <a:prstGeom prst="rect">
+            <a:avLst/>
+          </a:prstGeom>
+          <a:noFill/>
+        </p:spPr>
+        <p:txBody>
+          <a:bodyPr wrap="none">
+            <a:spAutoFit/>
+          </a:bodyPr>
+          <a:lstStyle/>
+          <a:p>
+            <a:pPr>
+              <a:defRPr sz="1800"/>
+            </a:pPr>
+            <a:r>
+              <a:t>Body content</a:t>
+            </a:r>
+          </a:p>
+          <a:p>
+            <a:r>
+              <a:t>• Bullet point 1</a:t>
+            </a:r>
+          </a:p>
+          <a:p>
+            <a:r>
+              <a:t>• Bullet point 2</a:t>
+            </a:r>
+          </a:p>
+        </p:txBody>
+      </p:sp>
+    </p:spTree>
+  </p:cSld>
+  <p:clrMapOvr>
+    <a:masterClrMapping/>
+  </p:clrMapOvr>
+</p:sld>
+</file>
+
+<file path=ppt/slides/slide4.xml><?xml version="1.0" encoding="utf-8"?>
+<p:sld xmlns:a="http://schemas.openxmlformats.org/drawingml/2006/main" xmlns:p="http://schemas.openxmlformats.org/presentationml/2006/main" xmlns:r="http://schemas.openxmlformats.org/officeDocument/2006/relationships">
+  <p:cSld>
+    <p:spTree>
+      <p:nvGrpSpPr>
+        <p:cNvPr id="1" name=""/>
+        <p:cNvGrpSpPr/>
+        <p:nvPr/>
+      </p:nvGrpSpPr>
+      <p:grpSpPr/>
+      <p:sp>
+        <p:nvSpPr>
+          <p:cNvPr id="2" name="TextBox 1"/>
+          <p:cNvSpPr txBox="1"/>
+          <p:nvPr/>
+        </p:nvSpPr>
+        <p:spPr>
+          <a:xfrm>
+            <a:off x="914400" y="457200"/>
+            <a:ext cx="7315200" cy="1371600"/>
+          </a:xfrm>
+          <a:prstGeom prst="rect">
+            <a:avLst/>
+          </a:prstGeom>
+          <a:noFill/>
+        </p:spPr>
+        <p:txBody>
+          <a:bodyPr wrap="none">
+            <a:spAutoFit/>
+          </a:bodyPr>
+          <a:lstStyle/>
+          <a:p>
+            <a:pPr algn="ctr">
+              <a:defRPr sz="4400" b="1"/>
+            </a:pPr>
+            <a:r>
+              <a:t>Title Text</a:t>
+            </a:r>
+          </a:p>
+        </p:txBody>
+      </p:sp>
+      <p:graphicFrame>
+        <p:nvGraphicFramePr>
+          <p:cNvPr id="3" name="Chart 2"/>
+          <p:cNvGraphicFramePr>
+            <a:graphicFrameLocks noGrp="1"/>
+          </p:cNvGraphicFramePr>
+          <p:nvPr/>
+        </p:nvGraphicFramePr>
+        <p:xfrm>
+          <a:off x="914400" y="1828800"/>
+          <a:ext cx="7315200" cy="3657600"/>
+        </p:xfrm>
+        <a:graphic>
+          <a:graphicData uri="http://schemas.openxmlformats.org/drawingml/2006/chart">
+            <c:chart xmlns:c="http://schemas.openxmlformats.org/drawingml/2006/chart" r:id="rId2"/>
+          </a:graphicData>
+        </a:graphic>
+      </p:graphicFrame>
+    </p:spTree>
+  </p:cSld>
+  <p:clrMapOvr>
+    <a:masterClrMapping/>
+  </p:clrMapOvr>
+</p:sld>
+</file>
+
+<file path=ppt/slides/slide5.xml><?xml version="1.0" encoding="utf-8"?>
+<p:sld xmlns:a="http://schemas.openxmlformats.org/drawingml/2006/main" xmlns:p="http://schemas.openxmlformats.org/presentationml/2006/main" xmlns:r="http://schemas.openxmlformats.org/officeDocument/2006/relationships">
+  <p:cSld>
+    <p:spTree>
+      <p:nvGrpSpPr>
+        <p:cNvPr id="1" name=""/>
+        <p:cNvGrpSpPr/>
+        <p:nvPr/>
+      </p:nvGrpSpPr>
+      <p:grpSpPr/>
+      <p:sp>
+        <p:nvSpPr>
+          <p:cNvPr id="2" name="TextBox 1"/>
+          <p:cNvSpPr txBox="1"/>
+          <p:nvPr/>
+        </p:nvSpPr>
+        <p:spPr>
+          <a:xfrm>
+            <a:off x="914400" y="457200"/>
+            <a:ext cx="7315200" cy="1371600"/>
+          </a:xfrm>
+          <a:prstGeom prst="rect">
+            <a:avLst/>
+          </a:prstGeom>
+          <a:noFill/>
+        </p:spPr>
+        <p:txBody>
+          <a:bodyPr wrap="none">
+            <a:spAutoFit/>
+          </a:bodyPr>
+          <a:lstStyle/>
+          <a:p>
+            <a:pPr algn="ctr">
+              <a:defRPr sz="4400" b="1"/>
+            </a:pPr>
+            <a:r>
+              <a:t>Title Text</a:t>
+            </a:r>
+          </a:p>
+        </p:txBody>
+      </p:sp>
+      <p:graphicFrame>
+        <p:nvGraphicFramePr>
+          <p:cNvPr id="3" name="Table 2"/>
+          <p:cNvGraphicFramePr>
+            <a:graphicFrameLocks noGrp="1"/>
+          </p:cNvGraphicFramePr>
+          <p:nvPr/>
+        </p:nvGraphicFramePr>
+        <p:xfrm>
+          <a:off x="914400" y="1828800"/>
+          <a:ext cx="7315200" cy="3657600"/>
+        </p:xfrm>
+        <a:graphic>
+          <a:graphicData uri="http://schemas.openxmlformats.org/drawingml/2006/table">
+            <a:tbl>
+              <a:tblPr firstRow="1" bandRow="1">
+                <a:tableStyleId>{5C22544A-7EE6-4342-B048-85BDC9FD1C3A}</a:tableStyleId>
+              </a:tblPr>
+              <a:tblGrid>
+                <a:gridCol w="2438400"/>
+                <a:gridCol w="2438400"/>
+                <a:gridCol w="2438400"/>
+              </a:tblGrid>
+              <a:tr h="1219200">
+                <a:tc>
+                  <a:txBody>
+                    <a:bodyPr/>
+                    <a:lstStyle/>
+                    <a:p>
+                      <a:r>
+                        <a:t>Header 1</a:t>
+                      </a:r>
+                    </a:p>
+                  </a:txBody>
+                  <a:tcPr/>
+                </a:tc>
+                <a:tc>
+                  <a:txBody>
+                    <a:bodyPr/>
+                    <a:lstStyle/>
+                    <a:p>
+                      <a:r>
+                        <a:t>Header 2</a:t>
+                      </a:r>
+                    </a:p>
+                  </a:txBody>
+                  <a:tcPr/>
+                </a:tc>
+                <a:tc>
+                  <a:txBody>
+                    <a:bodyPr/>
+                    <a:lstStyle/>
+                    <a:p>
+                      <a:r>
+                        <a:t>Header 3</a:t>
+                      </a:r>
+                    </a:p>
+                  </a:txBody>
+                  <a:tcPr/>
+                </a:tc>
+              </a:tr>
+              <a:tr h="1219200">
+                <a:tc>
+                  <a:txBody>
+                    <a:bodyPr/>
+                    <a:lstStyle/>
+                    <a:p>
+                      <a:r>
+                        <a:t>Cell 1,0</a:t>
+                      </a:r>
+                    </a:p>
+                  </a:txBody>
+                  <a:tcPr/>
+                </a:tc>
+                <a:tc>
+                  <a:txBody>
+                    <a:bodyPr/>
+                    <a:lstStyle/>
+                    <a:p>
+                      <a:r>
+                        <a:t>Cell 1,1</a:t>
+                      </a:r>
+                    </a:p>
+                  </a:txBody>
+                  <a:tcPr/>
+                </a:tc>
+                <a:tc>
+                  <a:txBody>
+                    <a:bodyPr/>
+                    <a:lstStyle/>
+                    <a:p>
+                      <a:r>
+                        <a:t>Cell 1,2</a:t>
+                      </a:r>
+                    </a:p>
+                  </a:txBody>
+                  <a:tcPr/>
+                </a:tc>
+              </a:tr>
+              <a:tr h="1219200">
+                <a:tc>
+                  <a:txBody>
+                    <a:bodyPr/>
+                    <a:lstStyle/>
+                    <a:p>
+                      <a:r>
+                        <a:t>Cell 2,0</a:t>
+                      </a:r>
+                    </a:p>
+                  </a:txBody>
+                  <a:tcPr/>
+                </a:tc>
+                <a:tc>
+                  <a:txBody>
+                    <a:bodyPr/>
+                    <a:lstStyle/>
+                    <a:p>
+                      <a:r>
+                        <a:t>Cell 2,1</a:t>
+                      </a:r>
+                    </a:p>
+                  </a:txBody>
+                  <a:tcPr/>
+                </a:tc>
+                <a:tc>
+                  <a:txBody>
+                    <a:bodyPr/>
+                    <a:lstStyle/>
+                    <a:p>
+                      <a:r>
+                        <a:t>Cell 2,2</a:t>
+                      </a:r>
+                    </a:p>
+                  </a:txBody>
+                  <a:tcPr/>
+                </a:tc>
+              </a:tr>
+            </a:tbl>
+          </a:graphicData>
+        </a:graphic>
+      </p:graphicFrame>
+    </p:spTree>
+  </p:cSld>
+  <p:clrMapOvr>
+    <a:masterClrMapping/>
+  </p:clrMapOvr>
+</p:sld>
+</file>
+
+<file path=ppt/slides/slide6.xml><?xml version="1.0" encoding="utf-8"?>
+<p:sld xmlns:a="http://schemas.openxmlformats.org/drawingml/2006/main" xmlns:p="http://schemas.openxmlformats.org/presentationml/2006/main" xmlns:r="http://schemas.openxmlformats.org/officeDocument/2006/relationships">
+  <p:cSld>
+    <p:spTree>
+      <p:nvGrpSpPr>
+        <p:cNvPr id="1" name=""/>
+        <p:cNvGrpSpPr/>
+        <p:nvPr/>
+      </p:nvGrpSpPr>
+      <p:grpSpPr/>
+      <p:sp>
+        <p:nvSpPr>
+          <p:cNvPr id="2" name="TextBox 1"/>
+          <p:cNvSpPr txBox="1"/>
+          <p:nvPr/>
+        </p:nvSpPr>
+        <p:spPr>
+          <a:xfrm>
+            <a:off x="914400" y="457200"/>
+            <a:ext cx="7315200" cy="914400"/>
+          </a:xfrm>
+          <a:prstGeom prst="rect">
+            <a:avLst/>
+          </a:prstGeom>
+          <a:noFill/>
+        </p:spPr>
+        <p:txBody>
+          <a:bodyPr wrap="none">
+            <a:spAutoFit/>
+          </a:bodyPr>
+          <a:lstStyle/>
+          <a:p>
+            <a:pPr algn="ctr">
+              <a:defRPr sz="4400" b="1"/>
+            </a:pPr>
+            <a:r>
+              <a:t>Title Text</a:t>
+            </a:r>
+          </a:p>
+        </p:txBody>
+      </p:sp>
+      <p:sp>
+        <p:nvSpPr>
+          <p:cNvPr id="3" name="TextBox 2"/>
+          <p:cNvSpPr txBox="1"/>
+          <p:nvPr/>
+        </p:nvSpPr>
+        <p:spPr>
+          <a:xfrm>
+            <a:off x="914400" y="1828800"/>
+            <a:ext cx="3657600" cy="3657600"/>
+          </a:xfrm>
+          <a:prstGeom prst="rect">
+            <a:avLst/>
+          </a:prstGeom>
+          <a:noFill/>
+        </p:spPr>
+        <p:txBody>
+          <a:bodyPr wrap="none">
+            <a:spAutoFit/>
+          </a:bodyPr>
+          <a:lstStyle/>
+          <a:p>
+            <a:pPr>
+              <a:defRPr sz="1800"/>
+            </a:pPr>
+            <a:r>
+              <a:t>Body content</a:t>
+            </a:r>
+          </a:p>
+          <a:p>
+            <a:r>
+              <a:t>• Bullet point 1</a:t>
+            </a:r>
+          </a:p>
+          <a:p>
+            <a:r>
+              <a:t>• Bullet point 2</a:t>
+            </a:r>
+          </a:p>
+        </p:txBody>
+      </p:sp>
+      <p:sp>
+        <p:nvSpPr>
+          <p:cNvPr id="4" name="TextBox 3"/>
+          <p:cNvSpPr txBox="1"/>
+          <p:nvPr/>
+        </p:nvSpPr>
+        <p:spPr>
+          <a:xfrm>
+            <a:off x="914400" y="2286000"/>
+            <a:ext cx="7315200" cy="1371600"/>
+          </a:xfrm>
+          <a:prstGeom prst="rect">
+            <a:avLst/>
+          </a:prstGeom>
+          <a:noFill/>
+        </p:spPr>
+        <p:txBody>
+          <a:bodyPr wrap="none">
+            <a:spAutoFit/>
+          </a:bodyPr>
+          <a:lstStyle/>
+          <a:p>
+            <a:pPr algn="ctr">
+              <a:defRPr sz="3600" b="1"/>
+            </a:pPr>
+            <a:r>
+              <a:t>Center Title</a:t>
+            </a:r>
+          </a:p>
+        </p:txBody>
+      </p:sp>
+      <p:sp>
+        <p:nvSpPr>
+          <p:cNvPr id="5" name="TextBox 4"/>
+          <p:cNvSpPr txBox="1"/>
+          <p:nvPr/>
+        </p:nvSpPr>
+        <p:spPr>
+          <a:xfrm>
+            <a:off x="914400" y="1371600"/>
+            <a:ext cx="7315200" cy="731520"/>
+          </a:xfrm>
+          <a:prstGeom prst="rect">
+            <a:avLst/>
+          </a:prstGeom>
+          <a:noFill/>
+        </p:spPr>
+        <p:txBody>
+          <a:bodyPr wrap="none">
+            <a:spAutoFit/>
+          </a:bodyPr>
+          <a:lstStyle/>
+          <a:p>
+            <a:pPr algn="ctr">
+              <a:defRPr sz="2400"/>
+            </a:pPr>
+            <a:r>
+              <a:t>Subtitle Text</a:t>
+            </a:r>
+          </a:p>
+        </p:txBody>
+      </p:sp>
+      <p:sp>
+        <p:nvSpPr>
+          <p:cNvPr id="6" name="Rectangle 5"/>
+          <p:cNvSpPr/>
+          <p:nvPr/>
+        </p:nvSpPr>
+        <p:spPr>
+          <a:xfrm>
+            <a:off x="5029200" y="1828800"/>
+            <a:ext cx="2743200" cy="1828800"/>
+          </a:xfrm>
+          <a:prstGeom prst="rect">
+            <a:avLst/>
+          </a:prstGeom>
+        </p:spPr>
+        <p:style>
+          <a:lnRef idx="1">
+            <a:schemeClr val="accent1"/>
+          </a:lnRef>
+          <a:fillRef idx="3">
+            <a:schemeClr val="accent1"/>
+          </a:fillRef>
+          <a:effectRef idx="2">
+            <a:schemeClr val="accent1"/>
+          </a:effectRef>
+          <a:fontRef idx="minor">
+            <a:schemeClr val="lt1"/>
+          </a:fontRef>
+        </p:style>
+        <p:txBody>
+          <a:bodyPr rtlCol="0" anchor="ctr"/>
+          <a:lstStyle/>
+          <a:p>
+            <a:r>
+              <a:t>Object Content</a:t>
+            </a:r>
+          </a:p>
+        </p:txBody>
+      </p:sp>
+      <p:graphicFrame>
+        <p:nvGraphicFramePr>
+          <p:cNvPr id="7" name="Chart 6"/>
+          <p:cNvGraphicFramePr>
+            <a:graphicFrameLocks noGrp="1"/>
+          </p:cNvGraphicFramePr>
+          <p:nvPr/>
+        </p:nvGraphicFramePr>
+        <p:xfrm>
+          <a:off x="914400" y="1828800"/>
+          <a:ext cx="3657600" cy="2743200"/>
+        </p:xfrm>
+        <a:graphic>
+          <a:graphicData uri="http://schemas.openxmlformats.org/drawingml/2006/chart">
+            <c:chart xmlns:c="http://schemas.openxmlformats.org/drawingml/2006/chart" r:id="rId2"/>
+          </a:graphicData>
+        </a:graphic>
+      </p:graphicFrame>
+      <p:graphicFrame>
+        <p:nvGraphicFramePr>
+          <p:cNvPr id="8" name="Table 7"/>
+          <p:cNvGraphicFramePr>
+            <a:graphicFrameLocks noGrp="1"/>
+          </p:cNvGraphicFramePr>
+          <p:nvPr/>
+        </p:nvGraphicFramePr>
+        <p:xfrm>
+          <a:off x="5029200" y="1828800"/>
+          <a:ext cx="2743200" cy="2743200"/>
+        </p:xfrm>
+        <a:graphic>
+          <a:graphicData uri="http://schemas.openxmlformats.org/drawingml/2006/table">
+            <a:tbl>
+              <a:tblPr firstRow="1" bandRow="1">
+                <a:tableStyleId>{5C22544A-7EE6-4342-B048-85BDC9FD1C3A}</a:tableStyleId>
+              </a:tblPr>
+              <a:tblGrid>
+                <a:gridCol w="914400"/>
+                <a:gridCol w="914400"/>
+                <a:gridCol w="914400"/>
+              </a:tblGrid>
+              <a:tr h="914400">
+                <a:tc>
+                  <a:txBody>
+                    <a:bodyPr/>
+                    <a:lstStyle/>
+                    <a:p>
+                      <a:r>
+                        <a:t>Header 1</a:t>
+                      </a:r>
+                    </a:p>
+                  </a:txBody>
+                  <a:tcPr/>
+                </a:tc>
+                <a:tc>
+                  <a:txBody>
+                    <a:bodyPr/>
+                    <a:lstStyle/>
+                    <a:p>
+                      <a:r>
+                        <a:t>Header 2</a:t>
+                      </a:r>
+                    </a:p>
+                  </a:txBody>
+                  <a:tcPr/>
+                </a:tc>
+                <a:tc>
+                  <a:txBody>
+                    <a:bodyPr/>
+                    <a:lstStyle/>
+                    <a:p>
+                      <a:r>
+                        <a:t>Header 3</a:t>
+                      </a:r>
+                    </a:p>
+                  </a:txBody>
+                  <a:tcPr/>
+                </a:tc>
+              </a:tr>
+              <a:tr h="914400">
+                <a:tc>
+                  <a:txBody>
+                    <a:bodyPr/>
+                    <a:lstStyle/>
+                    <a:p>
+                      <a:r>
+                        <a:t>Cell 1,0</a:t>
+                      </a:r>
+                    </a:p>
+                  </a:txBody>
+                  <a:tcPr/>
+                </a:tc>
+                <a:tc>
+                  <a:txBody>
+                    <a:bodyPr/>
+                    <a:lstStyle/>
+                    <a:p>
+                      <a:r>
+                        <a:t>Cell 1,1</a:t>
+                      </a:r>
+                    </a:p>
+                  </a:txBody>
+                  <a:tcPr/>
+                </a:tc>
+                <a:tc>
+                  <a:txBody>
+                    <a:bodyPr/>
+                    <a:lstStyle/>
+                    <a:p>
+                      <a:r>
+                        <a:t>Cell 1,2</a:t>
+                      </a:r>
+                    </a:p>
+                  </a:txBody>
+                  <a:tcPr/>
+                </a:tc>
+              </a:tr>
+              <a:tr h="914400">
+                <a:tc>
+                  <a:txBody>
+                    <a:bodyPr/>
+                    <a:lstStyle/>
+                    <a:p>
+                      <a:r>
+                        <a:t>Cell 2,0</a:t>
+                      </a:r>
+                    </a:p>
+                  </a:txBody>
+                  <a:tcPr/>
+                </a:tc>
+                <a:tc>
+                  <a:txBody>
+                    <a:bodyPr/>
+                    <a:lstStyle/>
+                    <a:p>
+                      <a:r>
+                        <a:t>Cell 2,1</a:t>
+                      </a:r>
+                    </a:p>
+                  </a:txBody>
+                  <a:tcPr/>
+                </a:tc>
+                <a:tc>
+                  <a:txBody>
+                    <a:bodyPr/>
+                    <a:lstStyle/>
+                    <a:p>
+                      <a:r>
+                        <a:t>Cell 2,2</a:t>
+                      </a:r>
+                    </a:p>
+                  </a:txBody>
+                  <a:tcPr/>
+                </a:tc>
+              </a:tr>
+            </a:tbl>
+          </a:graphicData>
+        </a:graphic>
+      </p:graphicFrame>
+      <p:sp>
+        <p:nvSpPr>
+          <p:cNvPr id="9" name="Oval 8"/>
+          <p:cNvSpPr/>
+          <p:nvPr/>
+        </p:nvSpPr>
+        <p:spPr>
+          <a:xfrm>
+            <a:off x="914400" y="5029200"/>
+            <a:ext cx="1828800" cy="1371600"/>
+          </a:xfrm>
+          <a:prstGeom prst="ellipse">
+            <a:avLst/>
+          </a:prstGeom>
+        </p:spPr>
+        <p:style>
+          <a:lnRef idx="1">
+            <a:schemeClr val="accent1"/>
+          </a:lnRef>
+          <a:fillRef idx="3">
+            <a:schemeClr val="accent1"/>
+          </a:fillRef>
+          <a:effectRef idx="2">
+            <a:schemeClr val="accent1"/>
+          </a:effectRef>
+          <a:fontRef idx="minor">
+            <a:schemeClr val="lt1"/>
+          </a:fontRef>
+        </p:style>
+        <p:txBody>
+          <a:bodyPr rtlCol="0" anchor="ctr"/>
+          <a:lstStyle/>
+          <a:p>
+            <a:pPr algn="ctr"/>
+            <a:r>
+              <a:t>Clip Art</a:t>
+            </a:r>
+          </a:p>
+        </p:txBody>
+      </p:sp>
+      <p:sp>
+        <p:nvSpPr>
+          <p:cNvPr id="10" name="Rounded Rectangle 9"/>
+          <p:cNvSpPr/>
+          <p:nvPr/>
+        </p:nvSpPr>
+        <p:spPr>
+          <a:xfrm>
+            <a:off x="3200400" y="5029200"/>
+            <a:ext cx="2286000" cy="1371600"/>
+          </a:xfrm>
+          <a:prstGeom prst="roundRect">
+            <a:avLst/>
+          </a:prstGeom>
+        </p:spPr>
+        <p:style>
+          <a:lnRef idx="1">
+            <a:schemeClr val="accent1"/>
+          </a:lnRef>
+          <a:fillRef idx="3">
+            <a:schemeClr val="accent1"/>
+          </a:fillRef>
+          <a:effectRef idx="2">
+            <a:schemeClr val="accent1"/>
+          </a:effectRef>
+          <a:fontRef idx="minor">
+            <a:schemeClr val="lt1"/>
+          </a:fontRef>
+        </p:style>
+        <p:txBody>
+          <a:bodyPr rtlCol="0" anchor="ctr"/>
+          <a:lstStyle/>
+          <a:p>
+            <a:pPr algn="ctr"/>
+            <a:r>
+              <a:t>Diagram (SmartArt)</a:t>
+            </a:r>
+          </a:p>
+        </p:txBody>
+      </p:sp>
+      <p:sp>
+        <p:nvSpPr>
+          <p:cNvPr id="11" name="Rectangle 10"/>
+          <p:cNvSpPr/>
+          <p:nvPr/>
+        </p:nvSpPr>
+        <p:spPr>
+          <a:xfrm>
+            <a:off x="5943600" y="5029200"/>
+            <a:ext cx="2286000" cy="1371600"/>
+          </a:xfrm>
+          <a:prstGeom prst="rect">
+            <a:avLst/>
+          </a:prstGeom>
+          <a:solidFill>
+            <a:srgbClr val="C8C8C8"/>
+          </a:solidFill>
+        </p:spPr>
+        <p:style>
+          <a:lnRef idx="1">
+            <a:schemeClr val="accent1"/>
+          </a:lnRef>
+          <a:fillRef idx="3">
+            <a:schemeClr val="accent1"/>
+          </a:fillRef>
+          <a:effectRef idx="2">
+            <a:schemeClr val="accent1"/>
+          </a:effectRef>
+          <a:fontRef idx="minor">
+            <a:schemeClr val="lt1"/>
+          </a:fontRef>
+        </p:style>
+        <p:txBody>
+          <a:bodyPr rtlCol="0" anchor="ctr"/>
+          <a:lstStyle/>
+          <a:p>
+            <a:pPr algn="ctr"/>
+            <a:r>
+              <a:t>Media Content</a:t>
+            </a:r>
+          </a:p>
+        </p:txBody>
+      </p:sp>
+      <p:sp>
+        <p:nvSpPr>
+          <p:cNvPr id="12" name="Rectangle 11"/>
+          <p:cNvSpPr/>
+          <p:nvPr/>
+        </p:nvSpPr>
+        <p:spPr>
+          <a:xfrm>
+            <a:off x="914400" y="5486400"/>
+            <a:ext cx="1828800" cy="914400"/>
+          </a:xfrm>
+          <a:prstGeom prst="rect">
+            <a:avLst/>
+          </a:prstGeom>
+          <a:ln w="25400">
+            <a:solidFill>
+              <a:srgbClr val="646464"/>
+            </a:solidFill>
+          </a:ln>
+        </p:spPr>
+        <p:style>
+          <a:lnRef idx="1">
+            <a:schemeClr val="accent1"/>
+          </a:lnRef>
+          <a:fillRef idx="3">
+            <a:schemeClr val="accent1"/>
+          </a:fillRef>
+          <a:effectRef idx="2">
+            <a:schemeClr val="accent1"/>
+          </a:effectRef>
+          <a:fontRef idx="minor">
+            <a:schemeClr val="lt1"/>
+          </a:fontRef>
+        </p:style>
+        <p:txBody>
+          <a:bodyPr rtlCol="0" anchor="ctr"/>
+          <a:lstStyle/>
+          <a:p>
+            <a:pPr algn="ctr"/>
+            <a:r>
+              <a:t>Picture</a:t>
+            </a:r>
+          </a:p>
+        </p:txBody>
+      </p:sp>
     </p:spTree>
   </p:cSld>
   <p:clrMapOvr>

</xml_diff>